<commit_message>
Add more notes on HTML tags
</commit_message>
<xml_diff>
--- a/HTML and CSS.pptx
+++ b/HTML and CSS.pptx
@@ -5,7 +5,7 @@
     <p:sldMasterId id="2147483696" r:id="rId1"/>
   </p:sldMasterIdLst>
   <p:notesMasterIdLst>
-    <p:notesMasterId r:id="rId11"/>
+    <p:notesMasterId r:id="rId16"/>
   </p:notesMasterIdLst>
   <p:sldIdLst>
     <p:sldId id="256" r:id="rId2"/>
@@ -15,8 +15,13 @@
     <p:sldId id="261" r:id="rId6"/>
     <p:sldId id="263" r:id="rId7"/>
     <p:sldId id="265" r:id="rId8"/>
-    <p:sldId id="264" r:id="rId9"/>
-    <p:sldId id="262" r:id="rId10"/>
+    <p:sldId id="266" r:id="rId9"/>
+    <p:sldId id="267" r:id="rId10"/>
+    <p:sldId id="268" r:id="rId11"/>
+    <p:sldId id="269" r:id="rId12"/>
+    <p:sldId id="270" r:id="rId13"/>
+    <p:sldId id="264" r:id="rId14"/>
+    <p:sldId id="262" r:id="rId15"/>
   </p:sldIdLst>
   <p:sldSz cx="12192000" cy="6858000"/>
   <p:notesSz cx="6858000" cy="9144000"/>
@@ -21116,6 +21121,601 @@
 </p:sld>
 </file>
 
+<file path=ppt/slides/slide10.xml><?xml version="1.0" encoding="utf-8"?>
+<p:sld xmlns:a="http://schemas.openxmlformats.org/drawingml/2006/main" xmlns:r="http://schemas.openxmlformats.org/officeDocument/2006/relationships" xmlns:p="http://schemas.openxmlformats.org/presentationml/2006/main">
+  <p:cSld>
+    <p:spTree>
+      <p:nvGrpSpPr>
+        <p:cNvPr id="1" name=""/>
+        <p:cNvGrpSpPr/>
+        <p:nvPr/>
+      </p:nvGrpSpPr>
+      <p:grpSpPr>
+        <a:xfrm>
+          <a:off x="0" y="0"/>
+          <a:ext cx="0" cy="0"/>
+          <a:chOff x="0" y="0"/>
+          <a:chExt cx="0" cy="0"/>
+        </a:xfrm>
+      </p:grpSpPr>
+      <p:sp>
+        <p:nvSpPr>
+          <p:cNvPr id="2" name="Title 1">
+            <a:extLst>
+              <a:ext uri="{FF2B5EF4-FFF2-40B4-BE49-F238E27FC236}">
+                <a16:creationId xmlns:a16="http://schemas.microsoft.com/office/drawing/2014/main" id="{3A72BD35-4DF7-4158-BD3A-9659B1AA894D}"/>
+              </a:ext>
+            </a:extLst>
+          </p:cNvPr>
+          <p:cNvSpPr>
+            <a:spLocks noGrp="1"/>
+          </p:cNvSpPr>
+          <p:nvPr>
+            <p:ph type="title"/>
+          </p:nvPr>
+        </p:nvSpPr>
+        <p:spPr/>
+        <p:txBody>
+          <a:bodyPr/>
+          <a:lstStyle/>
+          <a:p>
+            <a:r>
+              <a:rPr lang="en-CA" dirty="0"/>
+              <a:t>Lots of tags</a:t>
+            </a:r>
+          </a:p>
+        </p:txBody>
+      </p:sp>
+      <p:sp>
+        <p:nvSpPr>
+          <p:cNvPr id="3" name="Content Placeholder 2">
+            <a:extLst>
+              <a:ext uri="{FF2B5EF4-FFF2-40B4-BE49-F238E27FC236}">
+                <a16:creationId xmlns:a16="http://schemas.microsoft.com/office/drawing/2014/main" id="{BF6FFCAD-03F2-41DE-AFF1-CD68A87FF74E}"/>
+              </a:ext>
+            </a:extLst>
+          </p:cNvPr>
+          <p:cNvSpPr>
+            <a:spLocks noGrp="1"/>
+          </p:cNvSpPr>
+          <p:nvPr>
+            <p:ph idx="1"/>
+          </p:nvPr>
+        </p:nvSpPr>
+        <p:spPr/>
+        <p:txBody>
+          <a:bodyPr/>
+          <a:lstStyle/>
+          <a:p>
+            <a:r>
+              <a:rPr lang="en-CA" dirty="0">
+                <a:hlinkClick r:id="rId2"/>
+              </a:rPr>
+              <a:t>https://www.w3schools.com/tags/default.asp</a:t>
+            </a:r>
+            <a:endParaRPr lang="en-CA" dirty="0"/>
+          </a:p>
+          <a:p>
+            <a:endParaRPr lang="en-CA" dirty="0"/>
+          </a:p>
+          <a:p>
+            <a:endParaRPr lang="en-CA" dirty="0"/>
+          </a:p>
+        </p:txBody>
+      </p:sp>
+    </p:spTree>
+    <p:extLst>
+      <p:ext uri="{BB962C8B-B14F-4D97-AF65-F5344CB8AC3E}">
+        <p14:creationId xmlns:p14="http://schemas.microsoft.com/office/powerpoint/2010/main" val="2010379828"/>
+      </p:ext>
+    </p:extLst>
+  </p:cSld>
+  <p:clrMapOvr>
+    <a:masterClrMapping/>
+  </p:clrMapOvr>
+</p:sld>
+</file>
+
+<file path=ppt/slides/slide11.xml><?xml version="1.0" encoding="utf-8"?>
+<p:sld xmlns:a="http://schemas.openxmlformats.org/drawingml/2006/main" xmlns:r="http://schemas.openxmlformats.org/officeDocument/2006/relationships" xmlns:p="http://schemas.openxmlformats.org/presentationml/2006/main">
+  <p:cSld>
+    <p:spTree>
+      <p:nvGrpSpPr>
+        <p:cNvPr id="1" name=""/>
+        <p:cNvGrpSpPr/>
+        <p:nvPr/>
+      </p:nvGrpSpPr>
+      <p:grpSpPr>
+        <a:xfrm>
+          <a:off x="0" y="0"/>
+          <a:ext cx="0" cy="0"/>
+          <a:chOff x="0" y="0"/>
+          <a:chExt cx="0" cy="0"/>
+        </a:xfrm>
+      </p:grpSpPr>
+      <p:sp>
+        <p:nvSpPr>
+          <p:cNvPr id="2" name="Title 1">
+            <a:extLst>
+              <a:ext uri="{FF2B5EF4-FFF2-40B4-BE49-F238E27FC236}">
+                <a16:creationId xmlns:a16="http://schemas.microsoft.com/office/drawing/2014/main" id="{6B5629DE-CBD0-49BD-8EEC-B3A5C4829C7F}"/>
+              </a:ext>
+            </a:extLst>
+          </p:cNvPr>
+          <p:cNvSpPr>
+            <a:spLocks noGrp="1"/>
+          </p:cNvSpPr>
+          <p:nvPr>
+            <p:ph type="title"/>
+          </p:nvPr>
+        </p:nvSpPr>
+        <p:spPr/>
+        <p:txBody>
+          <a:bodyPr/>
+          <a:lstStyle/>
+          <a:p>
+            <a:r>
+              <a:rPr lang="en-CA" dirty="0"/>
+              <a:t>Lets try some!</a:t>
+            </a:r>
+          </a:p>
+        </p:txBody>
+      </p:sp>
+      <p:sp>
+        <p:nvSpPr>
+          <p:cNvPr id="3" name="Content Placeholder 2">
+            <a:extLst>
+              <a:ext uri="{FF2B5EF4-FFF2-40B4-BE49-F238E27FC236}">
+                <a16:creationId xmlns:a16="http://schemas.microsoft.com/office/drawing/2014/main" id="{CA9E5B93-C02D-4F23-AAD7-ABB165E55E90}"/>
+              </a:ext>
+            </a:extLst>
+          </p:cNvPr>
+          <p:cNvSpPr>
+            <a:spLocks noGrp="1"/>
+          </p:cNvSpPr>
+          <p:nvPr>
+            <p:ph idx="1"/>
+          </p:nvPr>
+        </p:nvSpPr>
+        <p:spPr/>
+        <p:txBody>
+          <a:bodyPr/>
+          <a:lstStyle/>
+          <a:p>
+            <a:pPr marL="457200" indent="-457200">
+              <a:buFont typeface="+mj-lt"/>
+              <a:buAutoNum type="arabicPeriod"/>
+            </a:pPr>
+            <a:r>
+              <a:rPr lang="en-CA" dirty="0"/>
+              <a:t>Make a document with an h1, two h2s and two p tags</a:t>
+            </a:r>
+          </a:p>
+          <a:p>
+            <a:pPr marL="457200" indent="-457200">
+              <a:buFont typeface="+mj-lt"/>
+              <a:buAutoNum type="arabicPeriod"/>
+            </a:pPr>
+            <a:endParaRPr lang="en-CA" dirty="0"/>
+          </a:p>
+          <a:p>
+            <a:pPr marL="457200" indent="-457200">
+              <a:buFont typeface="+mj-lt"/>
+              <a:buAutoNum type="arabicPeriod"/>
+            </a:pPr>
+            <a:r>
+              <a:rPr lang="en-CA" dirty="0"/>
+              <a:t>Add an </a:t>
+            </a:r>
+            <a:r>
+              <a:rPr lang="en-CA" dirty="0" err="1"/>
+              <a:t>img</a:t>
+            </a:r>
+            <a:r>
+              <a:rPr lang="en-CA" dirty="0"/>
+              <a:t> tag and an “a” tag</a:t>
+            </a:r>
+          </a:p>
+          <a:p>
+            <a:pPr marL="457200" indent="-457200">
+              <a:buFont typeface="+mj-lt"/>
+              <a:buAutoNum type="arabicPeriod"/>
+            </a:pPr>
+            <a:endParaRPr lang="en-CA" dirty="0"/>
+          </a:p>
+          <a:p>
+            <a:pPr marL="457200" indent="-457200">
+              <a:buFont typeface="+mj-lt"/>
+              <a:buAutoNum type="arabicPeriod"/>
+            </a:pPr>
+            <a:r>
+              <a:rPr lang="en-CA" dirty="0"/>
+              <a:t>Add a list with three elements</a:t>
+            </a:r>
+          </a:p>
+        </p:txBody>
+      </p:sp>
+    </p:spTree>
+    <p:extLst>
+      <p:ext uri="{BB962C8B-B14F-4D97-AF65-F5344CB8AC3E}">
+        <p14:creationId xmlns:p14="http://schemas.microsoft.com/office/powerpoint/2010/main" val="940949279"/>
+      </p:ext>
+    </p:extLst>
+  </p:cSld>
+  <p:clrMapOvr>
+    <a:masterClrMapping/>
+  </p:clrMapOvr>
+</p:sld>
+</file>
+
+<file path=ppt/slides/slide12.xml><?xml version="1.0" encoding="utf-8"?>
+<p:sld xmlns:a="http://schemas.openxmlformats.org/drawingml/2006/main" xmlns:r="http://schemas.openxmlformats.org/officeDocument/2006/relationships" xmlns:p="http://schemas.openxmlformats.org/presentationml/2006/main">
+  <p:cSld>
+    <p:spTree>
+      <p:nvGrpSpPr>
+        <p:cNvPr id="1" name=""/>
+        <p:cNvGrpSpPr/>
+        <p:nvPr/>
+      </p:nvGrpSpPr>
+      <p:grpSpPr>
+        <a:xfrm>
+          <a:off x="0" y="0"/>
+          <a:ext cx="0" cy="0"/>
+          <a:chOff x="0" y="0"/>
+          <a:chExt cx="0" cy="0"/>
+        </a:xfrm>
+      </p:grpSpPr>
+      <p:sp>
+        <p:nvSpPr>
+          <p:cNvPr id="2" name="Title 1">
+            <a:extLst>
+              <a:ext uri="{FF2B5EF4-FFF2-40B4-BE49-F238E27FC236}">
+                <a16:creationId xmlns:a16="http://schemas.microsoft.com/office/drawing/2014/main" id="{C0842840-6C08-41BA-80C0-F3FDFFE9B86F}"/>
+              </a:ext>
+            </a:extLst>
+          </p:cNvPr>
+          <p:cNvSpPr>
+            <a:spLocks noGrp="1"/>
+          </p:cNvSpPr>
+          <p:nvPr>
+            <p:ph type="title"/>
+          </p:nvPr>
+        </p:nvSpPr>
+        <p:spPr/>
+        <p:txBody>
+          <a:bodyPr/>
+          <a:lstStyle/>
+          <a:p>
+            <a:r>
+              <a:rPr lang="en-CA" dirty="0"/>
+              <a:t>Looks a bit ugly though</a:t>
+            </a:r>
+          </a:p>
+        </p:txBody>
+      </p:sp>
+      <p:sp>
+        <p:nvSpPr>
+          <p:cNvPr id="3" name="Content Placeholder 2">
+            <a:extLst>
+              <a:ext uri="{FF2B5EF4-FFF2-40B4-BE49-F238E27FC236}">
+                <a16:creationId xmlns:a16="http://schemas.microsoft.com/office/drawing/2014/main" id="{422EA81C-5C92-421F-AE96-1E8E1F12FDD1}"/>
+              </a:ext>
+            </a:extLst>
+          </p:cNvPr>
+          <p:cNvSpPr>
+            <a:spLocks noGrp="1"/>
+          </p:cNvSpPr>
+          <p:nvPr>
+            <p:ph idx="1"/>
+          </p:nvPr>
+        </p:nvSpPr>
+        <p:spPr/>
+        <p:txBody>
+          <a:bodyPr/>
+          <a:lstStyle/>
+          <a:p>
+            <a:endParaRPr lang="en-CA" dirty="0"/>
+          </a:p>
+        </p:txBody>
+      </p:sp>
+    </p:spTree>
+    <p:extLst>
+      <p:ext uri="{BB962C8B-B14F-4D97-AF65-F5344CB8AC3E}">
+        <p14:creationId xmlns:p14="http://schemas.microsoft.com/office/powerpoint/2010/main" val="2726472663"/>
+      </p:ext>
+    </p:extLst>
+  </p:cSld>
+  <p:clrMapOvr>
+    <a:masterClrMapping/>
+  </p:clrMapOvr>
+</p:sld>
+</file>
+
+<file path=ppt/slides/slide13.xml><?xml version="1.0" encoding="utf-8"?>
+<p:sld xmlns:a="http://schemas.openxmlformats.org/drawingml/2006/main" xmlns:r="http://schemas.openxmlformats.org/officeDocument/2006/relationships" xmlns:p="http://schemas.openxmlformats.org/presentationml/2006/main">
+  <p:cSld>
+    <p:spTree>
+      <p:nvGrpSpPr>
+        <p:cNvPr id="1" name=""/>
+        <p:cNvGrpSpPr/>
+        <p:nvPr/>
+      </p:nvGrpSpPr>
+      <p:grpSpPr>
+        <a:xfrm>
+          <a:off x="0" y="0"/>
+          <a:ext cx="0" cy="0"/>
+          <a:chOff x="0" y="0"/>
+          <a:chExt cx="0" cy="0"/>
+        </a:xfrm>
+      </p:grpSpPr>
+      <p:sp>
+        <p:nvSpPr>
+          <p:cNvPr id="2" name="Title 1">
+            <a:extLst>
+              <a:ext uri="{FF2B5EF4-FFF2-40B4-BE49-F238E27FC236}">
+                <a16:creationId xmlns:a16="http://schemas.microsoft.com/office/drawing/2014/main" id="{43E212B3-2957-497F-9E21-81FCA6A79EC2}"/>
+              </a:ext>
+            </a:extLst>
+          </p:cNvPr>
+          <p:cNvSpPr>
+            <a:spLocks noGrp="1"/>
+          </p:cNvSpPr>
+          <p:nvPr>
+            <p:ph type="title"/>
+          </p:nvPr>
+        </p:nvSpPr>
+        <p:spPr/>
+        <p:txBody>
+          <a:bodyPr/>
+          <a:lstStyle/>
+          <a:p>
+            <a:r>
+              <a:rPr lang="en-CA" dirty="0"/>
+              <a:t>CSS</a:t>
+            </a:r>
+          </a:p>
+        </p:txBody>
+      </p:sp>
+      <p:sp>
+        <p:nvSpPr>
+          <p:cNvPr id="3" name="Content Placeholder 2">
+            <a:extLst>
+              <a:ext uri="{FF2B5EF4-FFF2-40B4-BE49-F238E27FC236}">
+                <a16:creationId xmlns:a16="http://schemas.microsoft.com/office/drawing/2014/main" id="{0744AE8C-13F4-477E-8087-75DC9A24CA23}"/>
+              </a:ext>
+            </a:extLst>
+          </p:cNvPr>
+          <p:cNvSpPr>
+            <a:spLocks noGrp="1"/>
+          </p:cNvSpPr>
+          <p:nvPr>
+            <p:ph idx="1"/>
+          </p:nvPr>
+        </p:nvSpPr>
+        <p:spPr/>
+        <p:txBody>
+          <a:bodyPr/>
+          <a:lstStyle/>
+          <a:p>
+            <a:pPr marL="0" indent="0">
+              <a:buNone/>
+            </a:pPr>
+            <a:r>
+              <a:rPr lang="en-CA" dirty="0"/>
+              <a:t>Selector {</a:t>
+            </a:r>
+          </a:p>
+          <a:p>
+            <a:pPr marL="0" indent="0">
+              <a:buNone/>
+            </a:pPr>
+            <a:r>
+              <a:rPr lang="en-CA" dirty="0"/>
+              <a:t>    Property_1: Value;</a:t>
+            </a:r>
+          </a:p>
+          <a:p>
+            <a:pPr marL="0" indent="0">
+              <a:buNone/>
+            </a:pPr>
+            <a:r>
+              <a:rPr lang="en-CA" dirty="0"/>
+              <a:t>    Property_2: Value;</a:t>
+            </a:r>
+          </a:p>
+          <a:p>
+            <a:pPr marL="0" indent="0">
+              <a:buNone/>
+            </a:pPr>
+            <a:r>
+              <a:rPr lang="en-CA" dirty="0"/>
+              <a:t>}</a:t>
+            </a:r>
+          </a:p>
+        </p:txBody>
+      </p:sp>
+    </p:spTree>
+    <p:extLst>
+      <p:ext uri="{BB962C8B-B14F-4D97-AF65-F5344CB8AC3E}">
+        <p14:creationId xmlns:p14="http://schemas.microsoft.com/office/powerpoint/2010/main" val="1969230105"/>
+      </p:ext>
+    </p:extLst>
+  </p:cSld>
+  <p:clrMapOvr>
+    <a:masterClrMapping/>
+  </p:clrMapOvr>
+</p:sld>
+</file>
+
+<file path=ppt/slides/slide14.xml><?xml version="1.0" encoding="utf-8"?>
+<p:sld xmlns:a="http://schemas.openxmlformats.org/drawingml/2006/main" xmlns:r="http://schemas.openxmlformats.org/officeDocument/2006/relationships" xmlns:p="http://schemas.openxmlformats.org/presentationml/2006/main">
+  <p:cSld>
+    <p:spTree>
+      <p:nvGrpSpPr>
+        <p:cNvPr id="1" name=""/>
+        <p:cNvGrpSpPr/>
+        <p:nvPr/>
+      </p:nvGrpSpPr>
+      <p:grpSpPr>
+        <a:xfrm>
+          <a:off x="0" y="0"/>
+          <a:ext cx="0" cy="0"/>
+          <a:chOff x="0" y="0"/>
+          <a:chExt cx="0" cy="0"/>
+        </a:xfrm>
+      </p:grpSpPr>
+      <p:sp>
+        <p:nvSpPr>
+          <p:cNvPr id="2" name="Title 1">
+            <a:extLst>
+              <a:ext uri="{FF2B5EF4-FFF2-40B4-BE49-F238E27FC236}">
+                <a16:creationId xmlns:a16="http://schemas.microsoft.com/office/drawing/2014/main" id="{EA9178DB-FF5A-4DEA-8081-A89999BAC8DE}"/>
+              </a:ext>
+            </a:extLst>
+          </p:cNvPr>
+          <p:cNvSpPr>
+            <a:spLocks noGrp="1"/>
+          </p:cNvSpPr>
+          <p:nvPr>
+            <p:ph type="title"/>
+          </p:nvPr>
+        </p:nvSpPr>
+        <p:spPr/>
+        <p:txBody>
+          <a:bodyPr/>
+          <a:lstStyle/>
+          <a:p>
+            <a:r>
+              <a:rPr lang="en-CA" dirty="0"/>
+              <a:t>Resources</a:t>
+            </a:r>
+          </a:p>
+        </p:txBody>
+      </p:sp>
+      <p:sp>
+        <p:nvSpPr>
+          <p:cNvPr id="3" name="Content Placeholder 2">
+            <a:extLst>
+              <a:ext uri="{FF2B5EF4-FFF2-40B4-BE49-F238E27FC236}">
+                <a16:creationId xmlns:a16="http://schemas.microsoft.com/office/drawing/2014/main" id="{75D53DAC-EF41-4B8C-813B-86A5CF29B80D}"/>
+              </a:ext>
+            </a:extLst>
+          </p:cNvPr>
+          <p:cNvSpPr>
+            <a:spLocks noGrp="1"/>
+          </p:cNvSpPr>
+          <p:nvPr>
+            <p:ph idx="1"/>
+          </p:nvPr>
+        </p:nvSpPr>
+        <p:spPr/>
+        <p:txBody>
+          <a:bodyPr>
+            <a:normAutofit lnSpcReduction="10000"/>
+          </a:bodyPr>
+          <a:lstStyle/>
+          <a:p>
+            <a:r>
+              <a:rPr lang="en-CA" dirty="0">
+                <a:hlinkClick r:id="rId2"/>
+              </a:rPr>
+              <a:t>https://www.w3schools.com/</a:t>
+            </a:r>
+            <a:endParaRPr lang="en-CA" dirty="0"/>
+          </a:p>
+          <a:p>
+            <a:pPr lvl="1"/>
+            <a:r>
+              <a:rPr lang="en-CA" dirty="0"/>
+              <a:t>Tutorials, extensive references (documentation)</a:t>
+            </a:r>
+          </a:p>
+          <a:p>
+            <a:pPr lvl="1"/>
+            <a:r>
+              <a:rPr lang="en-CA" dirty="0"/>
+              <a:t>If you learned a tenth of what’s here you’re hireable at Google</a:t>
+            </a:r>
+          </a:p>
+          <a:p>
+            <a:endParaRPr lang="en-CA" dirty="0"/>
+          </a:p>
+          <a:p>
+            <a:r>
+              <a:rPr lang="en-CA" dirty="0">
+                <a:hlinkClick r:id="rId3"/>
+              </a:rPr>
+              <a:t>https://stackoverflow.com</a:t>
+            </a:r>
+            <a:endParaRPr lang="en-CA" dirty="0"/>
+          </a:p>
+          <a:p>
+            <a:pPr lvl="1"/>
+            <a:r>
+              <a:rPr lang="en-CA" dirty="0"/>
+              <a:t>The #1 programing questions and answers website</a:t>
+            </a:r>
+          </a:p>
+          <a:p>
+            <a:pPr lvl="1"/>
+            <a:r>
+              <a:rPr lang="en-CA" dirty="0"/>
+              <a:t>Be careful about asking questions, it’s more useful to see previously answered questions (Yours probably isn’t new)</a:t>
+            </a:r>
+          </a:p>
+          <a:p>
+            <a:endParaRPr lang="en-CA" dirty="0"/>
+          </a:p>
+          <a:p>
+            <a:r>
+              <a:rPr lang="en-CA" dirty="0">
+                <a:hlinkClick r:id="rId4"/>
+              </a:rPr>
+              <a:t>https://developer.mozilla.org/en-US/</a:t>
+            </a:r>
+            <a:endParaRPr lang="en-CA" dirty="0"/>
+          </a:p>
+          <a:p>
+            <a:pPr lvl="1"/>
+            <a:r>
+              <a:rPr lang="en-CA" dirty="0"/>
+              <a:t>More tutorials, more references</a:t>
+            </a:r>
+          </a:p>
+          <a:p>
+            <a:endParaRPr lang="en-CA" dirty="0"/>
+          </a:p>
+          <a:p>
+            <a:pPr marL="128016" lvl="1" indent="0">
+              <a:buNone/>
+            </a:pPr>
+            <a:endParaRPr lang="en-CA" dirty="0"/>
+          </a:p>
+          <a:p>
+            <a:endParaRPr lang="en-CA" dirty="0"/>
+          </a:p>
+          <a:p>
+            <a:endParaRPr lang="en-CA" dirty="0"/>
+          </a:p>
+          <a:p>
+            <a:pPr lvl="1"/>
+            <a:endParaRPr lang="en-CA" dirty="0"/>
+          </a:p>
+        </p:txBody>
+      </p:sp>
+    </p:spTree>
+    <p:extLst>
+      <p:ext uri="{BB962C8B-B14F-4D97-AF65-F5344CB8AC3E}">
+        <p14:creationId xmlns:p14="http://schemas.microsoft.com/office/powerpoint/2010/main" val="1059028407"/>
+      </p:ext>
+    </p:extLst>
+  </p:cSld>
+  <p:clrMapOvr>
+    <a:masterClrMapping/>
+  </p:clrMapOvr>
+</p:sld>
+</file>
+
 <file path=ppt/slides/slide2.xml><?xml version="1.0" encoding="utf-8"?>
 <p:sld xmlns:a="http://schemas.openxmlformats.org/drawingml/2006/main" xmlns:r="http://schemas.openxmlformats.org/officeDocument/2006/relationships" xmlns:p="http://schemas.openxmlformats.org/presentationml/2006/main">
   <p:cSld>
@@ -22078,7 +22678,7 @@
           <p:cNvPr id="2" name="Title 1">
             <a:extLst>
               <a:ext uri="{FF2B5EF4-FFF2-40B4-BE49-F238E27FC236}">
-                <a16:creationId xmlns:a16="http://schemas.microsoft.com/office/drawing/2014/main" id="{43E212B3-2957-497F-9E21-81FCA6A79EC2}"/>
+                <a16:creationId xmlns:a16="http://schemas.microsoft.com/office/drawing/2014/main" id="{17948176-505B-4C97-9A00-9C35FD64976F}"/>
               </a:ext>
             </a:extLst>
           </p:cNvPr>
@@ -22096,7 +22696,7 @@
           <a:p>
             <a:r>
               <a:rPr lang="en-CA" dirty="0"/>
-              <a:t>CSS</a:t>
+              <a:t>Some tags and where to find more</a:t>
             </a:r>
           </a:p>
         </p:txBody>
@@ -22106,7 +22706,7 @@
           <p:cNvPr id="3" name="Content Placeholder 2">
             <a:extLst>
               <a:ext uri="{FF2B5EF4-FFF2-40B4-BE49-F238E27FC236}">
-                <a16:creationId xmlns:a16="http://schemas.microsoft.com/office/drawing/2014/main" id="{0744AE8C-13F4-477E-8087-75DC9A24CA23}"/>
+                <a16:creationId xmlns:a16="http://schemas.microsoft.com/office/drawing/2014/main" id="{65E65553-A502-4F06-A492-E3ED8B8E0D82}"/>
               </a:ext>
             </a:extLst>
           </p:cNvPr>
@@ -22122,39 +22722,70 @@
           <a:bodyPr/>
           <a:lstStyle/>
           <a:p>
-            <a:pPr marL="0" indent="0">
-              <a:buNone/>
-            </a:pPr>
             <a:r>
               <a:rPr lang="en-CA" dirty="0"/>
-              <a:t>Selector {</a:t>
+              <a:t>&lt;h1&gt; TEXT &lt;/h1&gt;  ,  &lt;h2&gt; Text &lt;/h2&gt; ….  &lt;h6&gt; text &lt;/h6&gt;</a:t>
             </a:r>
           </a:p>
           <a:p>
-            <a:pPr marL="0" indent="0">
-              <a:buNone/>
-            </a:pPr>
+            <a:endParaRPr lang="en-CA" dirty="0"/>
+          </a:p>
+          <a:p>
             <a:r>
               <a:rPr lang="en-CA" dirty="0"/>
-              <a:t>    Property_1: Value;</a:t>
+              <a:t>&lt;p&gt; Paragraph of text &lt;/p&gt;</a:t>
             </a:r>
           </a:p>
           <a:p>
-            <a:pPr marL="0" indent="0">
-              <a:buNone/>
-            </a:pPr>
+            <a:endParaRPr lang="en-CA" dirty="0"/>
+          </a:p>
+          <a:p>
             <a:r>
               <a:rPr lang="en-CA" dirty="0"/>
-              <a:t>    Property_2: Value;</a:t>
+              <a:t>&lt;</a:t>
+            </a:r>
+            <a:r>
+              <a:rPr lang="en-CA" dirty="0" err="1"/>
+              <a:t>img</a:t>
+            </a:r>
+            <a:r>
+              <a:rPr lang="en-CA" dirty="0"/>
+              <a:t> </a:t>
+            </a:r>
+            <a:r>
+              <a:rPr lang="en-CA" dirty="0" err="1"/>
+              <a:t>src</a:t>
+            </a:r>
+            <a:r>
+              <a:rPr lang="en-CA" dirty="0"/>
+              <a:t>=</a:t>
+            </a:r>
+            <a:r>
+              <a:rPr lang="en-CA" dirty="0">
+                <a:hlinkClick r:id="rId2"/>
+              </a:rPr>
+              <a:t>https://www.website.com/picture_url</a:t>
+            </a:r>
+            <a:r>
+              <a:rPr lang="en-CA" dirty="0"/>
+              <a:t>&gt;</a:t>
             </a:r>
           </a:p>
           <a:p>
-            <a:pPr marL="0" indent="0">
-              <a:buNone/>
-            </a:pPr>
+            <a:endParaRPr lang="en-CA" dirty="0"/>
+          </a:p>
+          <a:p>
             <a:r>
               <a:rPr lang="en-CA" dirty="0"/>
-              <a:t>}</a:t>
+              <a:t>&lt;a </a:t>
+            </a:r>
+            <a:r>
+              <a:rPr lang="en-CA" dirty="0" err="1"/>
+              <a:t>href</a:t>
+            </a:r>
+            <a:r>
+              <a:rPr lang="en-CA" dirty="0"/>
+              <a:t>=“https://www.google.com”&gt;This is a hyper link now&lt;/a&gt;</a:t>
             </a:r>
           </a:p>
         </p:txBody>
@@ -22162,7 +22793,7 @@
     </p:spTree>
     <p:extLst>
       <p:ext uri="{BB962C8B-B14F-4D97-AF65-F5344CB8AC3E}">
-        <p14:creationId xmlns:p14="http://schemas.microsoft.com/office/powerpoint/2010/main" val="1969230105"/>
+        <p14:creationId xmlns:p14="http://schemas.microsoft.com/office/powerpoint/2010/main" val="516651721"/>
       </p:ext>
     </p:extLst>
   </p:cSld>
@@ -22194,7 +22825,7 @@
           <p:cNvPr id="2" name="Title 1">
             <a:extLst>
               <a:ext uri="{FF2B5EF4-FFF2-40B4-BE49-F238E27FC236}">
-                <a16:creationId xmlns:a16="http://schemas.microsoft.com/office/drawing/2014/main" id="{EA9178DB-FF5A-4DEA-8081-A89999BAC8DE}"/>
+                <a16:creationId xmlns:a16="http://schemas.microsoft.com/office/drawing/2014/main" id="{A68AD763-2AE1-4780-9C84-89AD5CAB1075}"/>
               </a:ext>
             </a:extLst>
           </p:cNvPr>
@@ -22212,7 +22843,7 @@
           <a:p>
             <a:r>
               <a:rPr lang="en-CA" dirty="0"/>
-              <a:t>Resources</a:t>
+              <a:t>Lists</a:t>
             </a:r>
           </a:p>
         </p:txBody>
@@ -22222,7 +22853,7 @@
           <p:cNvPr id="3" name="Content Placeholder 2">
             <a:extLst>
               <a:ext uri="{FF2B5EF4-FFF2-40B4-BE49-F238E27FC236}">
-                <a16:creationId xmlns:a16="http://schemas.microsoft.com/office/drawing/2014/main" id="{75D53DAC-EF41-4B8C-813B-86A5CF29B80D}"/>
+                <a16:creationId xmlns:a16="http://schemas.microsoft.com/office/drawing/2014/main" id="{EAC68C00-D7C8-4738-BC49-310616F38F74}"/>
               </a:ext>
             </a:extLst>
           </p:cNvPr>
@@ -22235,103 +22866,78 @@
         </p:nvSpPr>
         <p:spPr/>
         <p:txBody>
-          <a:bodyPr>
-            <a:normAutofit lnSpcReduction="10000"/>
-          </a:bodyPr>
+          <a:bodyPr/>
           <a:lstStyle/>
           <a:p>
             <a:r>
-              <a:rPr lang="en-CA" dirty="0">
-                <a:hlinkClick r:id="rId2"/>
-              </a:rPr>
-              <a:t>https://www.w3schools.com/</a:t>
-            </a:r>
-            <a:endParaRPr lang="en-CA" dirty="0"/>
-          </a:p>
-          <a:p>
-            <a:pPr lvl="1"/>
-            <a:r>
               <a:rPr lang="en-CA" dirty="0"/>
-              <a:t>Tutorials, extensive references (documentation)</a:t>
+              <a:t>&lt;ul&gt;</a:t>
             </a:r>
           </a:p>
           <a:p>
-            <a:pPr lvl="1"/>
+            <a:pPr marL="0" indent="0">
+              <a:buNone/>
+            </a:pPr>
             <a:r>
               <a:rPr lang="en-CA" dirty="0"/>
-              <a:t>If you learned a tenth of what’s here you’re hireable at Google</a:t>
+              <a:t>    &lt;li&gt;Thing 1&lt;/li&gt;</a:t>
             </a:r>
           </a:p>
           <a:p>
-            <a:endParaRPr lang="en-CA" dirty="0"/>
-          </a:p>
-          <a:p>
-            <a:r>
-              <a:rPr lang="en-CA" dirty="0">
-                <a:hlinkClick r:id="rId3"/>
-              </a:rPr>
-              <a:t>https://stackoverflow.com</a:t>
-            </a:r>
-            <a:endParaRPr lang="en-CA" dirty="0"/>
-          </a:p>
-          <a:p>
-            <a:pPr lvl="1"/>
+            <a:pPr marL="0" indent="0">
+              <a:buNone/>
+            </a:pPr>
             <a:r>
               <a:rPr lang="en-CA" dirty="0"/>
-              <a:t>The #1 programing questions and answers website</a:t>
+              <a:t>    &lt;li&gt;Thing 2&lt;/li&gt;</a:t>
             </a:r>
           </a:p>
           <a:p>
-            <a:pPr lvl="1"/>
+            <a:pPr marL="0" indent="0">
+              <a:buNone/>
+            </a:pPr>
             <a:r>
               <a:rPr lang="en-CA" dirty="0"/>
-              <a:t>Be careful about asking questions, it’s more useful to see previously answered questions (Yours probably isn’t new)</a:t>
+              <a:t>&lt;/ul&gt;</a:t>
             </a:r>
           </a:p>
           <a:p>
-            <a:endParaRPr lang="en-CA" dirty="0"/>
-          </a:p>
-          <a:p>
-            <a:r>
-              <a:rPr lang="en-CA" dirty="0">
-                <a:hlinkClick r:id="rId4"/>
-              </a:rPr>
-              <a:t>https://developer.mozilla.org/en-US/</a:t>
-            </a:r>
-            <a:endParaRPr lang="en-CA" dirty="0"/>
-          </a:p>
-          <a:p>
-            <a:pPr lvl="1"/>
-            <a:r>
-              <a:rPr lang="en-CA" dirty="0"/>
-              <a:t>More tutorials, more references</a:t>
-            </a:r>
-          </a:p>
-          <a:p>
-            <a:endParaRPr lang="en-CA" dirty="0"/>
-          </a:p>
-          <a:p>
-            <a:pPr marL="128016" lvl="1" indent="0">
+            <a:pPr marL="0" indent="0">
               <a:buNone/>
             </a:pPr>
             <a:endParaRPr lang="en-CA" dirty="0"/>
           </a:p>
           <a:p>
-            <a:endParaRPr lang="en-CA" dirty="0"/>
-          </a:p>
-          <a:p>
-            <a:endParaRPr lang="en-CA" dirty="0"/>
-          </a:p>
-          <a:p>
-            <a:pPr lvl="1"/>
-            <a:endParaRPr lang="en-CA" dirty="0"/>
+            <a:pPr marL="0" indent="0">
+              <a:buNone/>
+            </a:pPr>
+            <a:r>
+              <a:rPr lang="en-CA" dirty="0"/>
+              <a:t>Or use &lt;</a:t>
+            </a:r>
+            <a:r>
+              <a:rPr lang="en-CA" dirty="0" err="1"/>
+              <a:t>ol</a:t>
+            </a:r>
+            <a:r>
+              <a:rPr lang="en-CA" dirty="0"/>
+              <a:t>&gt; for an </a:t>
+            </a:r>
+            <a:r>
+              <a:rPr lang="en-CA" b="1" dirty="0"/>
+              <a:t>ordered</a:t>
+            </a:r>
+            <a:r>
+              <a:rPr lang="en-CA" dirty="0"/>
+              <a:t> list</a:t>
+            </a:r>
           </a:p>
         </p:txBody>
       </p:sp>
     </p:spTree>
     <p:extLst>
       <p:ext uri="{BB962C8B-B14F-4D97-AF65-F5344CB8AC3E}">
-        <p14:creationId xmlns:p14="http://schemas.microsoft.com/office/powerpoint/2010/main" val="1059028407"/>
+        <p14:creationId xmlns:p14="http://schemas.microsoft.com/office/powerpoint/2010/main" val="3972085750"/>
       </p:ext>
     </p:extLst>
   </p:cSld>

</xml_diff>